<commit_message>
added some more info to slides and provided more links for our code
</commit_message>
<xml_diff>
--- a/CIS 112 FINAL PRESENTATION.pptx
+++ b/CIS 112 FINAL PRESENTATION.pptx
@@ -5107,7 +5107,7 @@
           <a:lstStyle/>
           <a:p>
             <a:r>
-              <a:rPr lang="en-US" sz="2400"/>
+              <a:rPr lang="en-US" sz="2000" dirty="0"/>
               <a:t>Amazon:</a:t>
             </a:r>
           </a:p>
@@ -5118,25 +5118,64 @@
               <a:t> </a:t>
             </a:r>
             <a:r>
-              <a:rPr lang="en-US" dirty="0">
+              <a:rPr lang="en-US" sz="1600" dirty="0">
                 <a:hlinkClick r:id="rId2"/>
               </a:rPr>
               <a:t>https://www.geeksforgeeks.org/amazons-most-frequently-asked-interview-questions-set-2/</a:t>
             </a:r>
             <a:r>
-              <a:rPr lang="en-US" dirty="0"/>
+              <a:rPr lang="en-US" sz="1600" dirty="0"/>
               <a:t>, </a:t>
             </a:r>
             <a:r>
-              <a:rPr lang="en-US" dirty="0">
+              <a:rPr lang="en-US" sz="1600" dirty="0">
                 <a:hlinkClick r:id="rId3"/>
               </a:rPr>
               <a:t>https://www.educative.io/blog/crack-amazon-coding-interview-questions</a:t>
             </a:r>
-            <a:endParaRPr lang="en-US" dirty="0"/>
-          </a:p>
-          <a:p>
-            <a:endParaRPr lang="en-US" sz="2400"/>
+            <a:endParaRPr lang="en-US" sz="1600" dirty="0"/>
+          </a:p>
+          <a:p>
+            <a:r>
+              <a:rPr lang="en-US" sz="2000" dirty="0"/>
+              <a:t>It was difficult to find questions listed by specific companies, but here are some very useful resources for common java programming interview questions specific to trees:</a:t>
+            </a:r>
+          </a:p>
+          <a:p>
+            <a:pPr lvl="1"/>
+            <a:r>
+              <a:rPr lang="en-US" sz="1600" dirty="0">
+                <a:hlinkClick r:id="rId4"/>
+              </a:rPr>
+              <a:t>https://javabypatel.blogspot.com/2017/10/top-binary-tree-interview-questions.html</a:t>
+            </a:r>
+            <a:r>
+              <a:rPr lang="en-US" sz="1600" dirty="0"/>
+              <a:t> (Question 10: </a:t>
+            </a:r>
+            <a:r>
+              <a:rPr lang="en-US" sz="1600" b="0" i="0" dirty="0">
+                <a:effectLst/>
+                <a:latin typeface="Open Sans"/>
+              </a:rPr>
+              <a:t>Construct a Binary Tree from In-order and Level-order traversals?)</a:t>
+            </a:r>
+          </a:p>
+          <a:p>
+            <a:pPr lvl="1"/>
+            <a:r>
+              <a:rPr lang="en-US" sz="1600" dirty="0">
+                <a:hlinkClick r:id="rId5"/>
+              </a:rPr>
+              <a:t>https://www.geeksforgeeks.org/commonly-asked-data-structure-interview-questions-set-1/</a:t>
+            </a:r>
+            <a:r>
+              <a:rPr lang="en-US" sz="1600" dirty="0">
+                <a:latin typeface="Open Sans"/>
+              </a:rPr>
+              <a:t> (Tree traversal questions)</a:t>
+            </a:r>
+            <a:endParaRPr lang="en-US" sz="2000" dirty="0"/>
           </a:p>
         </p:txBody>
       </p:sp>
@@ -5768,47 +5807,47 @@
           <a:lstStyle/>
           <a:p>
             <a:r>
-              <a:rPr lang="en-US" sz="2200"/>
+              <a:rPr lang="en-US" sz="2200" dirty="0"/>
               <a:t>We went through the topics in class we had already covered, one of them being trees.</a:t>
             </a:r>
           </a:p>
           <a:p>
             <a:r>
-              <a:rPr lang="en-US" sz="2200"/>
+              <a:rPr lang="en-US" sz="2200" dirty="0"/>
               <a:t>We searched online about common interviewing questions for programming</a:t>
             </a:r>
           </a:p>
           <a:p>
             <a:r>
-              <a:rPr lang="en-US" sz="2200"/>
-              <a:t>Many online resources noted trees as being a common question for addressing recursion since the easiest way to with trees is through recursion</a:t>
-            </a:r>
-          </a:p>
-          <a:p>
-            <a:r>
-              <a:rPr lang="en-US" sz="2200"/>
+              <a:rPr lang="en-US" sz="2200" dirty="0"/>
+              <a:t>Many online resources noted trees as being a common question for addressing recursion since the easiest way to traverse trees is through recursion</a:t>
+            </a:r>
+          </a:p>
+          <a:p>
+            <a:r>
+              <a:rPr lang="en-US" sz="2200" dirty="0"/>
               <a:t>Some of the many sites we found:</a:t>
             </a:r>
           </a:p>
           <a:p>
             <a:pPr lvl="1"/>
             <a:r>
-              <a:rPr lang="en-US" sz="2200">
+              <a:rPr lang="en-US" sz="2200" dirty="0">
                 <a:hlinkClick r:id="rId2"/>
               </a:rPr>
               <a:t>http://www.programminginterview.com/content/trees</a:t>
             </a:r>
-            <a:endParaRPr lang="en-US" sz="2200"/>
+            <a:endParaRPr lang="en-US" sz="2200" dirty="0"/>
           </a:p>
           <a:p>
             <a:pPr lvl="1"/>
             <a:r>
-              <a:rPr lang="en-US" sz="2200">
+              <a:rPr lang="en-US" sz="2200" dirty="0">
                 <a:hlinkClick r:id="rId3"/>
               </a:rPr>
               <a:t>https://javarevisited.blogspot.com/2011/06/top-programming-interview-questions.html</a:t>
             </a:r>
-            <a:endParaRPr lang="en-US" sz="2200"/>
+            <a:endParaRPr lang="en-US" sz="2200" dirty="0"/>
           </a:p>
         </p:txBody>
       </p:sp>
@@ -7034,11 +7073,14 @@
           </a:bodyPr>
           <a:lstStyle/>
           <a:p>
-            <a:endParaRPr lang="en-US" sz="4000">
-              <a:solidFill>
-                <a:srgbClr val="FFFFFF"/>
-              </a:solidFill>
-            </a:endParaRPr>
+            <a:r>
+              <a:rPr lang="en-US" sz="4000">
+                <a:solidFill>
+                  <a:srgbClr val="FFFFFF"/>
+                </a:solidFill>
+              </a:rPr>
+              <a:t>Resources to use for code</a:t>
+            </a:r>
           </a:p>
         </p:txBody>
       </p:sp>
@@ -7071,12 +7113,21 @@
           <a:lstStyle/>
           <a:p>
             <a:r>
-              <a:rPr lang="en-US" sz="2400">
+              <a:rPr lang="en-US" sz="2400" dirty="0">
                 <a:hlinkClick r:id="rId2"/>
               </a:rPr>
               <a:t>https://www.java67.com/2016/07/binary-tree-preorder-traversal-in-java-without-recursion.html</a:t>
             </a:r>
-            <a:endParaRPr lang="en-US" sz="2400"/>
+            <a:endParaRPr lang="en-US" sz="2400" dirty="0"/>
+          </a:p>
+          <a:p>
+            <a:r>
+              <a:rPr lang="en-US" sz="1600" dirty="0">
+                <a:hlinkClick r:id="rId3"/>
+              </a:rPr>
+              <a:t>https://www.techiedelight.com/inorder-tree-traversal-iterative-recursive/</a:t>
+            </a:r>
+            <a:endParaRPr lang="en-US" sz="2400" dirty="0"/>
           </a:p>
         </p:txBody>
       </p:sp>

</xml_diff>